<commit_message>
added FHIR for clincians
</commit_message>
<xml_diff>
--- a/presentations/2018-01 Tutorials/Jan2018_FHIR for Clinicians.pptx
+++ b/presentations/2018-01 Tutorials/Jan2018_FHIR for Clinicians.pptx
@@ -27604,7 +27604,31 @@
             <a:pPr lvl="1"/>
             <a:r>
               <a:rPr lang="en-US" dirty="0" smtClean="0"/>
-              <a:t>Able to participate knowledgeably in FHIR projects</a:t>
+              <a:t>Know where to </a:t>
+            </a:r>
+            <a:r>
+              <a:rPr lang="en-US" smtClean="0"/>
+              <a:t>find information, </a:t>
+            </a:r>
+            <a:r>
+              <a:rPr lang="en-US" dirty="0" smtClean="0"/>
+              <a:t>and how </a:t>
+            </a:r>
+            <a:r>
+              <a:rPr lang="en-US" smtClean="0"/>
+              <a:t>to understand it</a:t>
+            </a:r>
+            <a:endParaRPr lang="en-US" smtClean="0"/>
+          </a:p>
+          <a:p>
+            <a:pPr lvl="1"/>
+            <a:r>
+              <a:rPr lang="en-US" dirty="0" smtClean="0"/>
+              <a:t>Able </a:t>
+            </a:r>
+            <a:r>
+              <a:rPr lang="en-US" dirty="0" smtClean="0"/>
+              <a:t>to participate knowledgeably in FHIR projects</a:t>
             </a:r>
           </a:p>
           <a:p>

</xml_diff>